<commit_message>
Adding the verification plots for chapter 7
</commit_message>
<xml_diff>
--- a/chapter_06/figures/verif_training_test_breakdown_pr_curve.pptx
+++ b/chapter_06/figures/verif_training_test_breakdown_pr_curve.pptx
@@ -125,12 +125,12 @@
   <pc:docChgLst>
     <pc:chgData name="Fatima Pillosu" userId="a6295d4dc9e22643" providerId="LiveId" clId="{39E4DD93-62FF-426E-ACE3-AEC539F82A6D}"/>
     <pc:docChg chg="undo custSel modSld modMainMaster">
-      <pc:chgData name="Fatima Pillosu" userId="a6295d4dc9e22643" providerId="LiveId" clId="{39E4DD93-62FF-426E-ACE3-AEC539F82A6D}" dt="2025-07-08T13:18:25.639" v="922" actId="1037"/>
+      <pc:chgData name="Fatima Pillosu" userId="a6295d4dc9e22643" providerId="LiveId" clId="{39E4DD93-62FF-426E-ACE3-AEC539F82A6D}" dt="2025-07-10T09:36:52.618" v="923" actId="20577"/>
       <pc:docMkLst>
         <pc:docMk/>
       </pc:docMkLst>
       <pc:sldChg chg="addSp delSp modSp mod">
-        <pc:chgData name="Fatima Pillosu" userId="a6295d4dc9e22643" providerId="LiveId" clId="{39E4DD93-62FF-426E-ACE3-AEC539F82A6D}" dt="2025-07-08T13:18:25.639" v="922" actId="1037"/>
+        <pc:chgData name="Fatima Pillosu" userId="a6295d4dc9e22643" providerId="LiveId" clId="{39E4DD93-62FF-426E-ACE3-AEC539F82A6D}" dt="2025-07-10T09:36:52.618" v="923" actId="20577"/>
         <pc:sldMkLst>
           <pc:docMk/>
           <pc:sldMk cId="2517527664" sldId="257"/>
@@ -152,7 +152,7 @@
           </ac:spMkLst>
         </pc:spChg>
         <pc:spChg chg="add mod">
-          <ac:chgData name="Fatima Pillosu" userId="a6295d4dc9e22643" providerId="LiveId" clId="{39E4DD93-62FF-426E-ACE3-AEC539F82A6D}" dt="2025-07-04T22:14:33.371" v="818"/>
+          <ac:chgData name="Fatima Pillosu" userId="a6295d4dc9e22643" providerId="LiveId" clId="{39E4DD93-62FF-426E-ACE3-AEC539F82A6D}" dt="2025-07-10T09:36:52.618" v="923" actId="20577"/>
           <ac:spMkLst>
             <pc:docMk/>
             <pc:sldMk cId="2517527664" sldId="257"/>
@@ -2906,7 +2906,7 @@
           <a:p>
             <a:fld id="{F0820250-0589-45C6-A87F-3E34BBC48915}" type="datetimeFigureOut">
               <a:rPr lang="en-GB" smtClean="0"/>
-              <a:t>08/07/2025</a:t>
+              <a:t>10/07/2025</a:t>
             </a:fld>
             <a:endParaRPr lang="en-GB"/>
           </a:p>
@@ -3076,7 +3076,7 @@
           <a:p>
             <a:fld id="{F0820250-0589-45C6-A87F-3E34BBC48915}" type="datetimeFigureOut">
               <a:rPr lang="en-GB" smtClean="0"/>
-              <a:t>08/07/2025</a:t>
+              <a:t>10/07/2025</a:t>
             </a:fld>
             <a:endParaRPr lang="en-GB"/>
           </a:p>
@@ -3256,7 +3256,7 @@
           <a:p>
             <a:fld id="{F0820250-0589-45C6-A87F-3E34BBC48915}" type="datetimeFigureOut">
               <a:rPr lang="en-GB" smtClean="0"/>
-              <a:t>08/07/2025</a:t>
+              <a:t>10/07/2025</a:t>
             </a:fld>
             <a:endParaRPr lang="en-GB"/>
           </a:p>
@@ -3426,7 +3426,7 @@
           <a:p>
             <a:fld id="{F0820250-0589-45C6-A87F-3E34BBC48915}" type="datetimeFigureOut">
               <a:rPr lang="en-GB" smtClean="0"/>
-              <a:t>08/07/2025</a:t>
+              <a:t>10/07/2025</a:t>
             </a:fld>
             <a:endParaRPr lang="en-GB"/>
           </a:p>
@@ -3672,7 +3672,7 @@
           <a:p>
             <a:fld id="{F0820250-0589-45C6-A87F-3E34BBC48915}" type="datetimeFigureOut">
               <a:rPr lang="en-GB" smtClean="0"/>
-              <a:t>08/07/2025</a:t>
+              <a:t>10/07/2025</a:t>
             </a:fld>
             <a:endParaRPr lang="en-GB"/>
           </a:p>
@@ -3904,7 +3904,7 @@
           <a:p>
             <a:fld id="{F0820250-0589-45C6-A87F-3E34BBC48915}" type="datetimeFigureOut">
               <a:rPr lang="en-GB" smtClean="0"/>
-              <a:t>08/07/2025</a:t>
+              <a:t>10/07/2025</a:t>
             </a:fld>
             <a:endParaRPr lang="en-GB"/>
           </a:p>
@@ -4271,7 +4271,7 @@
           <a:p>
             <a:fld id="{F0820250-0589-45C6-A87F-3E34BBC48915}" type="datetimeFigureOut">
               <a:rPr lang="en-GB" smtClean="0"/>
-              <a:t>08/07/2025</a:t>
+              <a:t>10/07/2025</a:t>
             </a:fld>
             <a:endParaRPr lang="en-GB"/>
           </a:p>
@@ -4389,7 +4389,7 @@
           <a:p>
             <a:fld id="{F0820250-0589-45C6-A87F-3E34BBC48915}" type="datetimeFigureOut">
               <a:rPr lang="en-GB" smtClean="0"/>
-              <a:t>08/07/2025</a:t>
+              <a:t>10/07/2025</a:t>
             </a:fld>
             <a:endParaRPr lang="en-GB"/>
           </a:p>
@@ -4484,7 +4484,7 @@
           <a:p>
             <a:fld id="{F0820250-0589-45C6-A87F-3E34BBC48915}" type="datetimeFigureOut">
               <a:rPr lang="en-GB" smtClean="0"/>
-              <a:t>08/07/2025</a:t>
+              <a:t>10/07/2025</a:t>
             </a:fld>
             <a:endParaRPr lang="en-GB"/>
           </a:p>
@@ -4761,7 +4761,7 @@
           <a:p>
             <a:fld id="{F0820250-0589-45C6-A87F-3E34BBC48915}" type="datetimeFigureOut">
               <a:rPr lang="en-GB" smtClean="0"/>
-              <a:t>08/07/2025</a:t>
+              <a:t>10/07/2025</a:t>
             </a:fld>
             <a:endParaRPr lang="en-GB"/>
           </a:p>
@@ -5018,7 +5018,7 @@
           <a:p>
             <a:fld id="{F0820250-0589-45C6-A87F-3E34BBC48915}" type="datetimeFigureOut">
               <a:rPr lang="en-GB" smtClean="0"/>
-              <a:t>08/07/2025</a:t>
+              <a:t>10/07/2025</a:t>
             </a:fld>
             <a:endParaRPr lang="en-GB"/>
           </a:p>
@@ -5231,7 +5231,7 @@
           <a:p>
             <a:fld id="{F0820250-0589-45C6-A87F-3E34BBC48915}" type="datetimeFigureOut">
               <a:rPr lang="en-GB" smtClean="0"/>
-              <a:t>08/07/2025</a:t>
+              <a:t>10/07/2025</a:t>
             </a:fld>
             <a:endParaRPr lang="en-GB"/>
           </a:p>
@@ -5692,7 +5692,7 @@
                 <a:latin typeface="Calibri" panose="020F0502020204030204" pitchFamily="34" charset="0"/>
                 <a:cs typeface="Calibri" panose="020F0502020204030204" pitchFamily="34" charset="0"/>
               </a:rPr>
-              <a:t>Verification results – Precision-Recall curve (breakdown score)</a:t>
+              <a:t>Verification results – Precision-Recall curves (breakdown score)</a:t>
             </a:r>
           </a:p>
           <a:p>

</xml_diff>